<commit_message>
[Adventure Works - Cost Optimization - 2026-02-20 (vbox-task-1452)] Update artifacts/project-results-deck.pptx
</commit_message>
<xml_diff>
--- a/Adventure Works - Cost Optimization - 2026-02-20 (vbox-task-1452)/artifacts/project-results-deck.pptx
+++ b/Adventure Works - Cost Optimization - 2026-02-20 (vbox-task-1452)/artifacts/project-results-deck.pptx
@@ -14717,7 +14717,7 @@
                         <a:latin typeface="Poppins SemiBold" panose="00000700000000000000" pitchFamily="2" charset="0"/>
                         <a:cs typeface="Poppins SemiBold" panose="00000700000000000000" pitchFamily="2" charset="0"/>
                       </a:rPr>
-                      <a:t>{{CPS}}</a:t>
+                      <a:t>10.95%</a:t>
                     </a:r>
                   </a:p>
                 </p:txBody>
@@ -14922,7 +14922,7 @@
                         <a:latin typeface="Poppins SemiBold" panose="00000700000000000000" pitchFamily="2" charset="0"/>
                         <a:cs typeface="Poppins SemiBold" panose="00000700000000000000" pitchFamily="2" charset="0"/>
                       </a:rPr>
-                      <a:t>{{CBU}}</a:t>
+                      <a:t>72.3%</a:t>
                     </a:r>
                   </a:p>
                 </p:txBody>
@@ -15127,7 +15127,7 @@
                         <a:latin typeface="Poppins SemiBold" panose="00000700000000000000" pitchFamily="2" charset="0"/>
                         <a:cs typeface="Poppins SemiBold" panose="00000700000000000000" pitchFamily="2" charset="0"/>
                       </a:rPr>
-                      <a:t>{{CTC}}</a:t>
+                      <a:t>57.99%</a:t>
                     </a:r>
                   </a:p>
                 </p:txBody>
@@ -15470,7 +15470,7 @@
                     <a:latin typeface="Poppins SemiBold" panose="00000700000000000000" pitchFamily="2" charset="0"/>
                     <a:cs typeface="Poppins SemiBold" panose="00000700000000000000" pitchFamily="2" charset="0"/>
                   </a:rPr>
-                  <a:t>{{SSS}}</a:t>
+                  <a:t>47%</a:t>
                 </a:r>
               </a:p>
             </p:txBody>
@@ -15621,7 +15621,7 @@
                     <a:latin typeface="Poppins SemiBold" panose="00000700000000000000" pitchFamily="2" charset="0"/>
                     <a:cs typeface="Poppins SemiBold" panose="00000700000000000000" pitchFamily="2" charset="0"/>
                   </a:rPr>
-                  <a:t>{{SES}}</a:t>
+                  <a:t>81.4%</a:t>
                 </a:r>
               </a:p>
             </p:txBody>
@@ -15772,7 +15772,7 @@
                     <a:latin typeface="Poppins SemiBold" panose="00000700000000000000" pitchFamily="2" charset="0"/>
                     <a:cs typeface="Poppins SemiBold" panose="00000700000000000000" pitchFamily="2" charset="0"/>
                   </a:rPr>
-                  <a:t>{{SDS}}</a:t>
+                  <a:t>59.8%</a:t>
                 </a:r>
               </a:p>
             </p:txBody>
@@ -16150,7 +16150,7 @@
                   <a:latin typeface="Poppins SemiBold" panose="00000700000000000000" pitchFamily="2" charset="0"/>
                   <a:cs typeface="Poppins SemiBold" panose="00000700000000000000" pitchFamily="2" charset="0"/>
                 </a:rPr>
-                <a:t>{{OMC}}</a:t>
+                <a:t>64.1%</a:t>
               </a:r>
             </a:p>
           </p:txBody>
@@ -16301,7 +16301,7 @@
                   <a:latin typeface="Poppins SemiBold" panose="00000700000000000000" pitchFamily="2" charset="0"/>
                   <a:cs typeface="Poppins SemiBold" panose="00000700000000000000" pitchFamily="2" charset="0"/>
                 </a:rPr>
-                <a:t>{{OPC}}</a:t>
+                <a:t>82.1%</a:t>
               </a:r>
             </a:p>
           </p:txBody>
@@ -16452,7 +16452,7 @@
                   <a:latin typeface="Poppins SemiBold" panose="00000700000000000000" pitchFamily="2" charset="0"/>
                   <a:cs typeface="Poppins SemiBold" panose="00000700000000000000" pitchFamily="2" charset="0"/>
                 </a:rPr>
-                <a:t>{{OBC}}</a:t>
+                <a:t>62.7%</a:t>
               </a:r>
             </a:p>
           </p:txBody>
@@ -19570,7 +19570,7 @@
                             <a:schemeClr val="tx1"/>
                           </a:solidFill>
                         </a:rPr>
-                        <a:t>{{TasksCreated}}</a:t>
+                        <a:t>5</a:t>
                       </a:r>
                     </a:p>
                   </a:txBody>
@@ -19612,7 +19612,7 @@
                             <a:schemeClr val="tx1"/>
                           </a:solidFill>
                         </a:rPr>
-                        <a:t>{{TasksCompleted}}</a:t>
+                        <a:t>1</a:t>
                       </a:r>
                     </a:p>
                   </a:txBody>
@@ -19654,7 +19654,7 @@
                             <a:schemeClr val="tx1"/>
                           </a:solidFill>
                         </a:rPr>
-                        <a:t>{{OptimizedResources}}</a:t>
+                        <a:t>2</a:t>
                       </a:r>
                     </a:p>
                   </a:txBody>
@@ -19709,7 +19709,7 @@
                             <a:srgbClr val="C00000"/>
                           </a:solidFill>
                         </a:rPr>
-                        <a:t>{{TotalSavings}}</a:t>
+                        <a:t>$354</a:t>
                       </a:r>
                     </a:p>
                   </a:txBody>
@@ -19755,7 +19755,7 @@
           <a:p>
             <a:r>
               <a:rPr lang="en-US" sz="4000" b="1" dirty="0"/>
-              <a:t>{{ROI}}</a:t>
+              <a:t>ROI = 0.5 months</a:t>
             </a:r>
           </a:p>
         </p:txBody>
@@ -19863,7 +19863,7 @@
                   <a:latin typeface="Poppins SemiBold" panose="00000700000000000000" pitchFamily="2" charset="0"/>
                   <a:cs typeface="Poppins SemiBold" panose="00000700000000000000" pitchFamily="2" charset="0"/>
                 </a:rPr>
-                <a:t>{{Cost1}}</a:t>
+                <a:t>$164,794.97</a:t>
               </a:r>
             </a:p>
           </p:txBody>
@@ -19907,7 +19907,7 @@
                   <a:latin typeface="Poppins SemiBold" panose="00000700000000000000" pitchFamily="2" charset="0"/>
                   <a:cs typeface="Poppins SemiBold" panose="00000700000000000000" pitchFamily="2" charset="0"/>
                 </a:rPr>
-                <a:t>{{Period1}}</a:t>
+                <a:t>January 2026</a:t>
               </a:r>
             </a:p>
           </p:txBody>
@@ -20093,7 +20093,7 @@
                   <a:latin typeface="Poppins SemiBold" panose="00000700000000000000" pitchFamily="2" charset="0"/>
                   <a:cs typeface="Poppins SemiBold" panose="00000700000000000000" pitchFamily="2" charset="0"/>
                 </a:rPr>
-                <a:t>{{Cost2}}</a:t>
+                <a:t>$71,772.86</a:t>
               </a:r>
             </a:p>
           </p:txBody>
@@ -20137,7 +20137,7 @@
                   <a:latin typeface="Poppins SemiBold" panose="00000700000000000000" pitchFamily="2" charset="0"/>
                   <a:cs typeface="Poppins SemiBold" panose="00000700000000000000" pitchFamily="2" charset="0"/>
                 </a:rPr>
-                <a:t>{{Period2}}</a:t>
+                <a:t>February 2026</a:t>
               </a:r>
             </a:p>
           </p:txBody>
@@ -20320,7 +20320,7 @@
                   <a:latin typeface="Poppins SemiBold" panose="00000700000000000000" pitchFamily="2" charset="0"/>
                   <a:cs typeface="Poppins SemiBold" panose="00000700000000000000" pitchFamily="2" charset="0"/>
                 </a:rPr>
-                <a:t>{{AvgCost}}</a:t>
+                <a:t>$2,563.32/day</a:t>
               </a:r>
               <a:endParaRPr lang="en-US" sz="2000" dirty="0">
                 <a:latin typeface="Poppins SemiBold" panose="00000700000000000000" pitchFamily="2" charset="0"/>
@@ -20507,7 +20507,7 @@
                   <a:latin typeface="Poppins SemiBold" panose="00000700000000000000" pitchFamily="2" charset="0"/>
                   <a:cs typeface="Poppins SemiBold" panose="00000700000000000000" pitchFamily="2" charset="0"/>
                 </a:rPr>
-                <a:t>{{Diff}}</a:t>
+                <a:t>-$93,022.11</a:t>
               </a:r>
             </a:p>
           </p:txBody>
@@ -20631,7 +20631,7 @@
                   <a:latin typeface="Poppins Black" panose="00000A00000000000000" pitchFamily="2" charset="0"/>
                   <a:cs typeface="Poppins Black" panose="00000A00000000000000" pitchFamily="2" charset="0"/>
                 </a:rPr>
-                <a:t>{{Pct}}</a:t>
+                <a:t>↓56.4%</a:t>
               </a:r>
             </a:p>
           </p:txBody>
@@ -20894,7 +20894,7 @@
                           <a:effectLst/>
                           <a:latin typeface="Aptos Narrow"/>
                         </a:rPr>
-                        <a:t>{{scope_table_col1}}</a:t>
+                        <a:t>Delete orphaned resources</a:t>
                       </a:r>
                     </a:p>
                   </a:txBody>
@@ -20914,7 +20914,7 @@
                           <a:effectLst/>
                           <a:latin typeface="Aptos Narrow"/>
                         </a:rPr>
-                        <a:t>{{scope_table_col2}}</a:t>
+                        <a:t>1</a:t>
                       </a:r>
                     </a:p>
                   </a:txBody>
@@ -20934,7 +20934,303 @@
                           <a:effectLst/>
                           <a:latin typeface="Aptos Narrow"/>
                         </a:rPr>
-                        <a:t>{{scope_table_col3}}</a:t>
+                        <a:t>2</a:t>
+                      </a:r>
+                      <a:endParaRPr lang="en-US" sz="2100" b="0" i="0" u="none" strike="noStrike" dirty="0">
+                        <a:solidFill>
+                          <a:srgbClr val="253746"/>
+                        </a:solidFill>
+                        <a:effectLst/>
+                        <a:latin typeface="Aptos Narrow"/>
+                      </a:endParaRPr>
+                    </a:p>
+                  </a:txBody>
+                  <a:tcPr marL="0" marR="0" marT="0" marB="0" anchor="b"/>
+                </a:tc>
+                <a:extLst>
+                  <a:ext uri="{0D108BD9-81ED-4DB2-BD59-A6C34878D82A}">
+                    <a16:rowId xmlns:a16="http://schemas.microsoft.com/office/drawing/2014/main" val="40419702"/>
+                  </a:ext>
+                </a:extLst>
+              </a:tr>
+              <a:tr h="456227">
+                <a:tc>
+                  <a:txBody>
+                    <a:bodyPr/>
+                    <a:lstStyle/>
+                    <a:p>
+                      <a:pPr algn="l" fontAlgn="b"/>
+                      <a:r>
+                        <a:rPr lang="en-US" sz="2100" b="0" i="0" u="none" strike="noStrike" dirty="0">
+                          <a:solidFill>
+                            <a:srgbClr val="000000"/>
+                          </a:solidFill>
+                          <a:effectLst/>
+                          <a:latin typeface="Aptos Narrow"/>
+                        </a:rPr>
+                        <a:t>Rightsize Azure AI Search</a:t>
+                      </a:r>
+                    </a:p>
+                  </a:txBody>
+                  <a:tcPr marL="0" marR="0" marT="0" marB="0" anchor="ctr"/>
+                </a:tc>
+                <a:tc>
+                  <a:txBody>
+                    <a:bodyPr/>
+                    <a:lstStyle/>
+                    <a:p>
+                      <a:pPr algn="ctr" fontAlgn="b"/>
+                      <a:r>
+                        <a:rPr lang="en-US" sz="2100" b="0" i="0" u="none" strike="noStrike" dirty="0">
+                          <a:solidFill>
+                            <a:srgbClr val="253746"/>
+                          </a:solidFill>
+                          <a:effectLst/>
+                          <a:latin typeface="Aptos Narrow"/>
+                        </a:rPr>
+                        <a:t>1</a:t>
+                      </a:r>
+                    </a:p>
+                  </a:txBody>
+                  <a:tcPr marL="0" marR="0" marT="0" marB="0" anchor="b"/>
+                </a:tc>
+                <a:tc>
+                  <a:txBody>
+                    <a:bodyPr/>
+                    <a:lstStyle/>
+                    <a:p>
+                      <a:pPr algn="ctr" fontAlgn="b"/>
+                      <a:r>
+                        <a:rPr lang="pl-PL" sz="2100" b="0" i="0" u="none" strike="noStrike" dirty="0">
+                          <a:solidFill>
+                            <a:srgbClr val="253746"/>
+                          </a:solidFill>
+                          <a:effectLst/>
+                          <a:latin typeface="Aptos Narrow"/>
+                        </a:rPr>
+                        <a:t>2</a:t>
+                      </a:r>
+                      <a:endParaRPr lang="en-US" sz="2100" b="0" i="0" u="none" strike="noStrike" dirty="0">
+                        <a:solidFill>
+                          <a:srgbClr val="253746"/>
+                        </a:solidFill>
+                        <a:effectLst/>
+                        <a:latin typeface="Aptos Narrow"/>
+                      </a:endParaRPr>
+                    </a:p>
+                  </a:txBody>
+                  <a:tcPr marL="0" marR="0" marT="0" marB="0" anchor="b"/>
+                </a:tc>
+                <a:extLst>
+                  <a:ext uri="{0D108BD9-81ED-4DB2-BD59-A6C34878D82A}">
+                    <a16:rowId xmlns:a16="http://schemas.microsoft.com/office/drawing/2014/main" val="40419702"/>
+                  </a:ext>
+                </a:extLst>
+              </a:tr>
+              <a:tr h="456227">
+                <a:tc>
+                  <a:txBody>
+                    <a:bodyPr/>
+                    <a:lstStyle/>
+                    <a:p>
+                      <a:pPr algn="l" fontAlgn="b"/>
+                      <a:r>
+                        <a:rPr lang="en-US" sz="2100" b="0" i="0" u="none" strike="noStrike" dirty="0">
+                          <a:solidFill>
+                            <a:srgbClr val="000000"/>
+                          </a:solidFill>
+                          <a:effectLst/>
+                          <a:latin typeface="Aptos Narrow"/>
+                        </a:rPr>
+                        <a:t>Purchase reservations</a:t>
+                      </a:r>
+                    </a:p>
+                  </a:txBody>
+                  <a:tcPr marL="0" marR="0" marT="0" marB="0" anchor="ctr"/>
+                </a:tc>
+                <a:tc>
+                  <a:txBody>
+                    <a:bodyPr/>
+                    <a:lstStyle/>
+                    <a:p>
+                      <a:pPr algn="ctr" fontAlgn="b"/>
+                      <a:r>
+                        <a:rPr lang="en-US" sz="2100" b="0" i="0" u="none" strike="noStrike" dirty="0">
+                          <a:solidFill>
+                            <a:srgbClr val="253746"/>
+                          </a:solidFill>
+                          <a:effectLst/>
+                          <a:latin typeface="Aptos Narrow"/>
+                        </a:rPr>
+                        <a:t>1</a:t>
+                      </a:r>
+                    </a:p>
+                  </a:txBody>
+                  <a:tcPr marL="0" marR="0" marT="0" marB="0" anchor="b"/>
+                </a:tc>
+                <a:tc>
+                  <a:txBody>
+                    <a:bodyPr/>
+                    <a:lstStyle/>
+                    <a:p>
+                      <a:pPr algn="ctr" fontAlgn="b"/>
+                      <a:r>
+                        <a:rPr lang="pl-PL" sz="2100" b="0" i="0" u="none" strike="noStrike" dirty="0">
+                          <a:solidFill>
+                            <a:srgbClr val="253746"/>
+                          </a:solidFill>
+                          <a:effectLst/>
+                          <a:latin typeface="Aptos Narrow"/>
+                        </a:rPr>
+                        <a:t>24</a:t>
+                      </a:r>
+                      <a:endParaRPr lang="en-US" sz="2100" b="0" i="0" u="none" strike="noStrike" dirty="0">
+                        <a:solidFill>
+                          <a:srgbClr val="253746"/>
+                        </a:solidFill>
+                        <a:effectLst/>
+                        <a:latin typeface="Aptos Narrow"/>
+                      </a:endParaRPr>
+                    </a:p>
+                  </a:txBody>
+                  <a:tcPr marL="0" marR="0" marT="0" marB="0" anchor="b"/>
+                </a:tc>
+                <a:extLst>
+                  <a:ext uri="{0D108BD9-81ED-4DB2-BD59-A6C34878D82A}">
+                    <a16:rowId xmlns:a16="http://schemas.microsoft.com/office/drawing/2014/main" val="40419702"/>
+                  </a:ext>
+                </a:extLst>
+              </a:tr>
+              <a:tr h="456227">
+                <a:tc>
+                  <a:txBody>
+                    <a:bodyPr/>
+                    <a:lstStyle/>
+                    <a:p>
+                      <a:pPr algn="l" fontAlgn="b"/>
+                      <a:r>
+                        <a:rPr lang="en-US" sz="2100" b="0" i="0" u="none" strike="noStrike" dirty="0">
+                          <a:solidFill>
+                            <a:srgbClr val="000000"/>
+                          </a:solidFill>
+                          <a:effectLst/>
+                          <a:latin typeface="Aptos Narrow"/>
+                        </a:rPr>
+                        <a:t>Downscale App Service Plans</a:t>
+                      </a:r>
+                    </a:p>
+                  </a:txBody>
+                  <a:tcPr marL="0" marR="0" marT="0" marB="0" anchor="ctr"/>
+                </a:tc>
+                <a:tc>
+                  <a:txBody>
+                    <a:bodyPr/>
+                    <a:lstStyle/>
+                    <a:p>
+                      <a:pPr algn="ctr" fontAlgn="b"/>
+                      <a:r>
+                        <a:rPr lang="en-US" sz="2100" b="0" i="0" u="none" strike="noStrike" dirty="0">
+                          <a:solidFill>
+                            <a:srgbClr val="253746"/>
+                          </a:solidFill>
+                          <a:effectLst/>
+                          <a:latin typeface="Aptos Narrow"/>
+                        </a:rPr>
+                        <a:t>1</a:t>
+                      </a:r>
+                    </a:p>
+                  </a:txBody>
+                  <a:tcPr marL="0" marR="0" marT="0" marB="0" anchor="b"/>
+                </a:tc>
+                <a:tc>
+                  <a:txBody>
+                    <a:bodyPr/>
+                    <a:lstStyle/>
+                    <a:p>
+                      <a:pPr algn="ctr" fontAlgn="b"/>
+                      <a:r>
+                        <a:rPr lang="pl-PL" sz="2100" b="0" i="0" u="none" strike="noStrike" dirty="0">
+                          <a:solidFill>
+                            <a:srgbClr val="253746"/>
+                          </a:solidFill>
+                          <a:effectLst/>
+                          <a:latin typeface="Aptos Narrow"/>
+                        </a:rPr>
+                        <a:t>16</a:t>
+                      </a:r>
+                      <a:endParaRPr lang="en-US" sz="2100" b="0" i="0" u="none" strike="noStrike" dirty="0">
+                        <a:solidFill>
+                          <a:srgbClr val="253746"/>
+                        </a:solidFill>
+                        <a:effectLst/>
+                        <a:latin typeface="Aptos Narrow"/>
+                      </a:endParaRPr>
+                    </a:p>
+                  </a:txBody>
+                  <a:tcPr marL="0" marR="0" marT="0" marB="0" anchor="b"/>
+                </a:tc>
+                <a:extLst>
+                  <a:ext uri="{0D108BD9-81ED-4DB2-BD59-A6C34878D82A}">
+                    <a16:rowId xmlns:a16="http://schemas.microsoft.com/office/drawing/2014/main" val="40419702"/>
+                  </a:ext>
+                </a:extLst>
+              </a:tr>
+              <a:tr h="456227">
+                <a:tc>
+                  <a:txBody>
+                    <a:bodyPr/>
+                    <a:lstStyle/>
+                    <a:p>
+                      <a:pPr algn="l" fontAlgn="b"/>
+                      <a:r>
+                        <a:rPr lang="en-US" sz="2100" b="0" i="0" u="none" strike="noStrike" dirty="0">
+                          <a:solidFill>
+                            <a:srgbClr val="000000"/>
+                          </a:solidFill>
+                          <a:effectLst/>
+                          <a:latin typeface="Aptos Narrow"/>
+                        </a:rPr>
+                        <a:t>Downscale or shutdown Virtual Machines</a:t>
+                      </a:r>
+                    </a:p>
+                  </a:txBody>
+                  <a:tcPr marL="0" marR="0" marT="0" marB="0" anchor="ctr"/>
+                </a:tc>
+                <a:tc>
+                  <a:txBody>
+                    <a:bodyPr/>
+                    <a:lstStyle/>
+                    <a:p>
+                      <a:pPr algn="ctr" fontAlgn="b"/>
+                      <a:r>
+                        <a:rPr lang="en-US" sz="2100" b="0" i="0" u="none" strike="noStrike" dirty="0">
+                          <a:solidFill>
+                            <a:srgbClr val="253746"/>
+                          </a:solidFill>
+                          <a:effectLst/>
+                          <a:latin typeface="Aptos Narrow"/>
+                        </a:rPr>
+                        <a:t>1</a:t>
+                      </a:r>
+                    </a:p>
+                  </a:txBody>
+                  <a:tcPr marL="0" marR="0" marT="0" marB="0" anchor="b"/>
+                </a:tc>
+                <a:tc>
+                  <a:txBody>
+                    <a:bodyPr/>
+                    <a:lstStyle/>
+                    <a:p>
+                      <a:pPr algn="ctr" fontAlgn="b"/>
+                      <a:r>
+                        <a:rPr lang="pl-PL" sz="2100" b="0" i="0" u="none" strike="noStrike" dirty="0">
+                          <a:solidFill>
+                            <a:srgbClr val="253746"/>
+                          </a:solidFill>
+                          <a:effectLst/>
+                          <a:latin typeface="Aptos Narrow"/>
+                        </a:rPr>
+                        <a:t>2</a:t>
                       </a:r>
                       <a:endParaRPr lang="en-US" sz="2100" b="0" i="0" u="none" strike="noStrike" dirty="0">
                         <a:solidFill>
@@ -21188,7 +21484,7 @@
                           </a:solidFill>
                           <a:effectLst/>
                         </a:rPr>
-                        <a:t>{{muted_table_col1}}</a:t>
+                        <a:t>Migrate SQL Databases to Azure SQL Databases</a:t>
                       </a:r>
                       <a:endParaRPr lang="en-US" sz="2100" b="0" i="0" u="none" strike="noStrike" dirty="0">
                         <a:solidFill>
@@ -21215,7 +21511,367 @@
                           <a:effectLst/>
                           <a:latin typeface="Aptos Narrow"/>
                         </a:rPr>
-                        <a:t>{{muted_table_col2}}</a:t>
+                        <a:t>2</a:t>
+                      </a:r>
+                      <a:endParaRPr lang="en-US" sz="2100" b="0" i="0" u="none" strike="noStrike" dirty="0">
+                        <a:solidFill>
+                          <a:srgbClr val="253746"/>
+                        </a:solidFill>
+                        <a:effectLst/>
+                        <a:latin typeface="Aptos Narrow"/>
+                      </a:endParaRPr>
+                    </a:p>
+                  </a:txBody>
+                  <a:tcPr marL="0" marR="0" marT="0" marB="0" anchor="b"/>
+                </a:tc>
+                <a:extLst>
+                  <a:ext uri="{0D108BD9-81ED-4DB2-BD59-A6C34878D82A}">
+                    <a16:rowId xmlns:a16="http://schemas.microsoft.com/office/drawing/2014/main" val="1959132790"/>
+                  </a:ext>
+                </a:extLst>
+              </a:tr>
+              <a:tr h="456227">
+                <a:tc>
+                  <a:txBody>
+                    <a:bodyPr/>
+                    <a:lstStyle/>
+                    <a:p>
+                      <a:pPr algn="l" fontAlgn="b"/>
+                      <a:r>
+                        <a:rPr lang="pl-PL" sz="2100" b="0" u="none" strike="noStrike" dirty="0">
+                          <a:solidFill>
+                            <a:srgbClr val="000000"/>
+                          </a:solidFill>
+                          <a:effectLst/>
+                        </a:rPr>
+                        <a:t>Switch to a cost-effective tier for Storage Accounts</a:t>
+                      </a:r>
+                      <a:endParaRPr lang="en-US" sz="2100" b="0" i="0" u="none" strike="noStrike" dirty="0">
+                        <a:solidFill>
+                          <a:srgbClr val="000000"/>
+                        </a:solidFill>
+                        <a:effectLst/>
+                        <a:latin typeface="Aptos Narrow"/>
+                      </a:endParaRPr>
+                    </a:p>
+                  </a:txBody>
+                  <a:tcPr marL="0" marR="0" marT="0" marB="0" anchor="ctr"/>
+                </a:tc>
+                <a:tc>
+                  <a:txBody>
+                    <a:bodyPr/>
+                    <a:lstStyle/>
+                    <a:p>
+                      <a:pPr algn="ctr" fontAlgn="b"/>
+                      <a:r>
+                        <a:rPr lang="pl-PL" sz="2100" b="0" i="0" u="none" strike="noStrike" dirty="0">
+                          <a:solidFill>
+                            <a:srgbClr val="253746"/>
+                          </a:solidFill>
+                          <a:effectLst/>
+                          <a:latin typeface="Aptos Narrow"/>
+                        </a:rPr>
+                        <a:t>15</a:t>
+                      </a:r>
+                      <a:endParaRPr lang="en-US" sz="2100" b="0" i="0" u="none" strike="noStrike" dirty="0">
+                        <a:solidFill>
+                          <a:srgbClr val="253746"/>
+                        </a:solidFill>
+                        <a:effectLst/>
+                        <a:latin typeface="Aptos Narrow"/>
+                      </a:endParaRPr>
+                    </a:p>
+                  </a:txBody>
+                  <a:tcPr marL="0" marR="0" marT="0" marB="0" anchor="b"/>
+                </a:tc>
+                <a:extLst>
+                  <a:ext uri="{0D108BD9-81ED-4DB2-BD59-A6C34878D82A}">
+                    <a16:rowId xmlns:a16="http://schemas.microsoft.com/office/drawing/2014/main" val="1959132790"/>
+                  </a:ext>
+                </a:extLst>
+              </a:tr>
+              <a:tr h="456227">
+                <a:tc>
+                  <a:txBody>
+                    <a:bodyPr/>
+                    <a:lstStyle/>
+                    <a:p>
+                      <a:pPr algn="l" fontAlgn="b"/>
+                      <a:r>
+                        <a:rPr lang="pl-PL" sz="2100" b="0" u="none" strike="noStrike" dirty="0">
+                          <a:solidFill>
+                            <a:srgbClr val="000000"/>
+                          </a:solidFill>
+                          <a:effectLst/>
+                        </a:rPr>
+                        <a:t>Delete unused Public IP addresses</a:t>
+                      </a:r>
+                      <a:endParaRPr lang="en-US" sz="2100" b="0" i="0" u="none" strike="noStrike" dirty="0">
+                        <a:solidFill>
+                          <a:srgbClr val="000000"/>
+                        </a:solidFill>
+                        <a:effectLst/>
+                        <a:latin typeface="Aptos Narrow"/>
+                      </a:endParaRPr>
+                    </a:p>
+                  </a:txBody>
+                  <a:tcPr marL="0" marR="0" marT="0" marB="0" anchor="ctr"/>
+                </a:tc>
+                <a:tc>
+                  <a:txBody>
+                    <a:bodyPr/>
+                    <a:lstStyle/>
+                    <a:p>
+                      <a:pPr algn="ctr" fontAlgn="b"/>
+                      <a:r>
+                        <a:rPr lang="pl-PL" sz="2100" b="0" i="0" u="none" strike="noStrike" dirty="0">
+                          <a:solidFill>
+                            <a:srgbClr val="253746"/>
+                          </a:solidFill>
+                          <a:effectLst/>
+                          <a:latin typeface="Aptos Narrow"/>
+                        </a:rPr>
+                        <a:t>6</a:t>
+                      </a:r>
+                      <a:endParaRPr lang="en-US" sz="2100" b="0" i="0" u="none" strike="noStrike" dirty="0">
+                        <a:solidFill>
+                          <a:srgbClr val="253746"/>
+                        </a:solidFill>
+                        <a:effectLst/>
+                        <a:latin typeface="Aptos Narrow"/>
+                      </a:endParaRPr>
+                    </a:p>
+                  </a:txBody>
+                  <a:tcPr marL="0" marR="0" marT="0" marB="0" anchor="b"/>
+                </a:tc>
+                <a:extLst>
+                  <a:ext uri="{0D108BD9-81ED-4DB2-BD59-A6C34878D82A}">
+                    <a16:rowId xmlns:a16="http://schemas.microsoft.com/office/drawing/2014/main" val="1959132790"/>
+                  </a:ext>
+                </a:extLst>
+              </a:tr>
+              <a:tr h="456227">
+                <a:tc>
+                  <a:txBody>
+                    <a:bodyPr/>
+                    <a:lstStyle/>
+                    <a:p>
+                      <a:pPr algn="l" fontAlgn="b"/>
+                      <a:r>
+                        <a:rPr lang="pl-PL" sz="2100" b="0" u="none" strike="noStrike" dirty="0">
+                          <a:solidFill>
+                            <a:srgbClr val="000000"/>
+                          </a:solidFill>
+                          <a:effectLst/>
+                        </a:rPr>
+                        <a:t>Move resources to cheaper region</a:t>
+                      </a:r>
+                      <a:endParaRPr lang="en-US" sz="2100" b="0" i="0" u="none" strike="noStrike" dirty="0">
+                        <a:solidFill>
+                          <a:srgbClr val="000000"/>
+                        </a:solidFill>
+                        <a:effectLst/>
+                        <a:latin typeface="Aptos Narrow"/>
+                      </a:endParaRPr>
+                    </a:p>
+                  </a:txBody>
+                  <a:tcPr marL="0" marR="0" marT="0" marB="0" anchor="ctr"/>
+                </a:tc>
+                <a:tc>
+                  <a:txBody>
+                    <a:bodyPr/>
+                    <a:lstStyle/>
+                    <a:p>
+                      <a:pPr algn="ctr" fontAlgn="b"/>
+                      <a:r>
+                        <a:rPr lang="pl-PL" sz="2100" b="0" i="0" u="none" strike="noStrike" dirty="0">
+                          <a:solidFill>
+                            <a:srgbClr val="253746"/>
+                          </a:solidFill>
+                          <a:effectLst/>
+                          <a:latin typeface="Aptos Narrow"/>
+                        </a:rPr>
+                        <a:t>3</a:t>
+                      </a:r>
+                      <a:endParaRPr lang="en-US" sz="2100" b="0" i="0" u="none" strike="noStrike" dirty="0">
+                        <a:solidFill>
+                          <a:srgbClr val="253746"/>
+                        </a:solidFill>
+                        <a:effectLst/>
+                        <a:latin typeface="Aptos Narrow"/>
+                      </a:endParaRPr>
+                    </a:p>
+                  </a:txBody>
+                  <a:tcPr marL="0" marR="0" marT="0" marB="0" anchor="b"/>
+                </a:tc>
+                <a:extLst>
+                  <a:ext uri="{0D108BD9-81ED-4DB2-BD59-A6C34878D82A}">
+                    <a16:rowId xmlns:a16="http://schemas.microsoft.com/office/drawing/2014/main" val="1959132790"/>
+                  </a:ext>
+                </a:extLst>
+              </a:tr>
+              <a:tr h="456227">
+                <a:tc>
+                  <a:txBody>
+                    <a:bodyPr/>
+                    <a:lstStyle/>
+                    <a:p>
+                      <a:pPr algn="l" fontAlgn="b"/>
+                      <a:r>
+                        <a:rPr lang="pl-PL" sz="2100" b="0" u="none" strike="noStrike" dirty="0">
+                          <a:solidFill>
+                            <a:srgbClr val="000000"/>
+                          </a:solidFill>
+                          <a:effectLst/>
+                        </a:rPr>
+                        <a:t>Delete orphaned resources</a:t>
+                      </a:r>
+                      <a:endParaRPr lang="en-US" sz="2100" b="0" i="0" u="none" strike="noStrike" dirty="0">
+                        <a:solidFill>
+                          <a:srgbClr val="000000"/>
+                        </a:solidFill>
+                        <a:effectLst/>
+                        <a:latin typeface="Aptos Narrow"/>
+                      </a:endParaRPr>
+                    </a:p>
+                  </a:txBody>
+                  <a:tcPr marL="0" marR="0" marT="0" marB="0" anchor="ctr"/>
+                </a:tc>
+                <a:tc>
+                  <a:txBody>
+                    <a:bodyPr/>
+                    <a:lstStyle/>
+                    <a:p>
+                      <a:pPr algn="ctr" fontAlgn="b"/>
+                      <a:r>
+                        <a:rPr lang="pl-PL" sz="2100" b="0" i="0" u="none" strike="noStrike" dirty="0">
+                          <a:solidFill>
+                            <a:srgbClr val="253746"/>
+                          </a:solidFill>
+                          <a:effectLst/>
+                          <a:latin typeface="Aptos Narrow"/>
+                        </a:rPr>
+                        <a:t>9</a:t>
+                      </a:r>
+                      <a:endParaRPr lang="en-US" sz="2100" b="0" i="0" u="none" strike="noStrike" dirty="0">
+                        <a:solidFill>
+                          <a:srgbClr val="253746"/>
+                        </a:solidFill>
+                        <a:effectLst/>
+                        <a:latin typeface="Aptos Narrow"/>
+                      </a:endParaRPr>
+                    </a:p>
+                  </a:txBody>
+                  <a:tcPr marL="0" marR="0" marT="0" marB="0" anchor="b"/>
+                </a:tc>
+                <a:extLst>
+                  <a:ext uri="{0D108BD9-81ED-4DB2-BD59-A6C34878D82A}">
+                    <a16:rowId xmlns:a16="http://schemas.microsoft.com/office/drawing/2014/main" val="1959132790"/>
+                  </a:ext>
+                </a:extLst>
+              </a:tr>
+              <a:tr h="456227">
+                <a:tc>
+                  <a:txBody>
+                    <a:bodyPr/>
+                    <a:lstStyle/>
+                    <a:p>
+                      <a:pPr algn="l" fontAlgn="b"/>
+                      <a:r>
+                        <a:rPr lang="pl-PL" sz="2100" b="0" u="none" strike="noStrike" dirty="0">
+                          <a:solidFill>
+                            <a:srgbClr val="000000"/>
+                          </a:solidFill>
+                          <a:effectLst/>
+                        </a:rPr>
+                        <a:t>Optimize storage redundancy</a:t>
+                      </a:r>
+                      <a:endParaRPr lang="en-US" sz="2100" b="0" i="0" u="none" strike="noStrike" dirty="0">
+                        <a:solidFill>
+                          <a:srgbClr val="000000"/>
+                        </a:solidFill>
+                        <a:effectLst/>
+                        <a:latin typeface="Aptos Narrow"/>
+                      </a:endParaRPr>
+                    </a:p>
+                  </a:txBody>
+                  <a:tcPr marL="0" marR="0" marT="0" marB="0" anchor="ctr"/>
+                </a:tc>
+                <a:tc>
+                  <a:txBody>
+                    <a:bodyPr/>
+                    <a:lstStyle/>
+                    <a:p>
+                      <a:pPr algn="ctr" fontAlgn="b"/>
+                      <a:r>
+                        <a:rPr lang="pl-PL" sz="2100" b="0" i="0" u="none" strike="noStrike" dirty="0">
+                          <a:solidFill>
+                            <a:srgbClr val="253746"/>
+                          </a:solidFill>
+                          <a:effectLst/>
+                          <a:latin typeface="Aptos Narrow"/>
+                        </a:rPr>
+                        <a:t>7</a:t>
+                      </a:r>
+                      <a:endParaRPr lang="en-US" sz="2100" b="0" i="0" u="none" strike="noStrike" dirty="0">
+                        <a:solidFill>
+                          <a:srgbClr val="253746"/>
+                        </a:solidFill>
+                        <a:effectLst/>
+                        <a:latin typeface="Aptos Narrow"/>
+                      </a:endParaRPr>
+                    </a:p>
+                  </a:txBody>
+                  <a:tcPr marL="0" marR="0" marT="0" marB="0" anchor="b"/>
+                </a:tc>
+                <a:extLst>
+                  <a:ext uri="{0D108BD9-81ED-4DB2-BD59-A6C34878D82A}">
+                    <a16:rowId xmlns:a16="http://schemas.microsoft.com/office/drawing/2014/main" val="1959132790"/>
+                  </a:ext>
+                </a:extLst>
+              </a:tr>
+              <a:tr h="456227">
+                <a:tc>
+                  <a:txBody>
+                    <a:bodyPr/>
+                    <a:lstStyle/>
+                    <a:p>
+                      <a:pPr algn="l" fontAlgn="b"/>
+                      <a:r>
+                        <a:rPr lang="pl-PL" sz="2100" b="0" u="none" strike="noStrike" dirty="0">
+                          <a:solidFill>
+                            <a:srgbClr val="000000"/>
+                          </a:solidFill>
+                          <a:effectLst/>
+                        </a:rPr>
+                        <a:t>Configure pipeline for redeployment of deallocated disks</a:t>
+                      </a:r>
+                      <a:endParaRPr lang="en-US" sz="2100" b="0" i="0" u="none" strike="noStrike" dirty="0">
+                        <a:solidFill>
+                          <a:srgbClr val="000000"/>
+                        </a:solidFill>
+                        <a:effectLst/>
+                        <a:latin typeface="Aptos Narrow"/>
+                      </a:endParaRPr>
+                    </a:p>
+                  </a:txBody>
+                  <a:tcPr marL="0" marR="0" marT="0" marB="0" anchor="ctr"/>
+                </a:tc>
+                <a:tc>
+                  <a:txBody>
+                    <a:bodyPr/>
+                    <a:lstStyle/>
+                    <a:p>
+                      <a:pPr algn="ctr" fontAlgn="b"/>
+                      <a:r>
+                        <a:rPr lang="pl-PL" sz="2100" b="0" i="0" u="none" strike="noStrike" dirty="0">
+                          <a:solidFill>
+                            <a:srgbClr val="253746"/>
+                          </a:solidFill>
+                          <a:effectLst/>
+                          <a:latin typeface="Aptos Narrow"/>
+                        </a:rPr>
+                        <a:t>4</a:t>
                       </a:r>
                       <a:endParaRPr lang="en-US" sz="2100" b="0" i="0" u="none" strike="noStrike" dirty="0">
                         <a:solidFill>
@@ -21513,7 +22169,7 @@
                           </a:solidFill>
                           <a:latin typeface="Aptos Narrow"/>
                         </a:rPr>
-                        <a:t>{{backlog_table_col1}}</a:t>
+                        <a:t>903</a:t>
                       </a:r>
                     </a:p>
                   </a:txBody>
@@ -21532,7 +22188,7 @@
                           </a:solidFill>
                           <a:latin typeface="Aptos Narrow"/>
                         </a:rPr>
-                        <a:t>{{backlog_table_col2}}</a:t>
+                        <a:t>Purchase reservations (VMs)</a:t>
                       </a:r>
                     </a:p>
                   </a:txBody>
@@ -21551,7 +22207,7 @@
                           </a:solidFill>
                           <a:latin typeface="Aptos Narrow"/>
                         </a:rPr>
-                        <a:t>{{backlog_table_col3}}</a:t>
+                        <a:t>67%</a:t>
                       </a:r>
                     </a:p>
                   </a:txBody>
@@ -21570,7 +22226,7 @@
                           </a:solidFill>
                           <a:latin typeface="Aptos Narrow"/>
                         </a:rPr>
-                        <a:t>{{backlog_table_col4}}</a:t>
+                        <a:t>⚪ Not Started</a:t>
                       </a:r>
                     </a:p>
                   </a:txBody>
@@ -21589,7 +22245,517 @@
                           </a:solidFill>
                           <a:latin typeface="Aptos Narrow"/>
                         </a:rPr>
-                        <a:t>{{backlog_table_col5}}</a:t>
+                        <a:t>🟠 High</a:t>
+                      </a:r>
+                    </a:p>
+                  </a:txBody>
+                  <a:tcPr marL="0" marR="0" marT="0" marB="0" anchor="ctr"/>
+                </a:tc>
+                <a:extLst>
+                  <a:ext uri="{0D108BD9-81ED-4DB2-BD59-A6C34878D82A}">
+                    <a16:rowId xmlns:a16="http://schemas.microsoft.com/office/drawing/2014/main" val="10001"/>
+                  </a:ext>
+                </a:extLst>
+              </a:tr>
+              <a:tr h="350000">
+                <a:tc>
+                  <a:txBody>
+                    <a:bodyPr/>
+                    <a:lstStyle/>
+                    <a:p>
+                      <a:pPr algn="ctr" fontAlgn="b"/>
+                      <a:r>
+                        <a:rPr lang="en-US" sz="1400" b="0" dirty="0">
+                          <a:solidFill>
+                            <a:srgbClr val="000000"/>
+                          </a:solidFill>
+                          <a:latin typeface="Aptos Narrow"/>
+                        </a:rPr>
+                        <a:t>865</a:t>
+                      </a:r>
+                    </a:p>
+                  </a:txBody>
+                  <a:tcPr marL="0" marR="0" marT="0" marB="0" anchor="ctr"/>
+                </a:tc>
+                <a:tc>
+                  <a:txBody>
+                    <a:bodyPr/>
+                    <a:lstStyle/>
+                    <a:p>
+                      <a:pPr algn="l" fontAlgn="b"/>
+                      <a:r>
+                        <a:rPr lang="en-US" sz="1400" b="0" dirty="0">
+                          <a:solidFill>
+                            <a:srgbClr val="000000"/>
+                          </a:solidFill>
+                          <a:latin typeface="Aptos Narrow"/>
+                        </a:rPr>
+                        <a:t>Purchase reservations (SQL Databases)</a:t>
+                      </a:r>
+                    </a:p>
+                  </a:txBody>
+                  <a:tcPr marL="0" marR="0" marT="0" marB="0" anchor="ctr"/>
+                </a:tc>
+                <a:tc>
+                  <a:txBody>
+                    <a:bodyPr/>
+                    <a:lstStyle/>
+                    <a:p>
+                      <a:pPr algn="ctr" fontAlgn="b"/>
+                      <a:r>
+                        <a:rPr lang="en-US" sz="1400" b="0" dirty="0">
+                          <a:solidFill>
+                            <a:srgbClr val="000000"/>
+                          </a:solidFill>
+                          <a:latin typeface="Aptos Narrow"/>
+                        </a:rPr>
+                        <a:t>60%</a:t>
+                      </a:r>
+                    </a:p>
+                  </a:txBody>
+                  <a:tcPr marL="0" marR="0" marT="0" marB="0" anchor="ctr"/>
+                </a:tc>
+                <a:tc>
+                  <a:txBody>
+                    <a:bodyPr/>
+                    <a:lstStyle/>
+                    <a:p>
+                      <a:pPr algn="ctr" fontAlgn="b"/>
+                      <a:r>
+                        <a:rPr lang="en-US" sz="1400" b="0" dirty="0">
+                          <a:solidFill>
+                            <a:srgbClr val="000000"/>
+                          </a:solidFill>
+                          <a:latin typeface="Aptos Narrow"/>
+                        </a:rPr>
+                        <a:t>🔵 In Progress</a:t>
+                      </a:r>
+                    </a:p>
+                  </a:txBody>
+                  <a:tcPr marL="0" marR="0" marT="0" marB="0" anchor="ctr"/>
+                </a:tc>
+                <a:tc>
+                  <a:txBody>
+                    <a:bodyPr/>
+                    <a:lstStyle/>
+                    <a:p>
+                      <a:pPr algn="ctr" fontAlgn="b"/>
+                      <a:r>
+                        <a:rPr lang="en-US" sz="1400" b="0" dirty="0">
+                          <a:solidFill>
+                            <a:srgbClr val="000000"/>
+                          </a:solidFill>
+                          <a:latin typeface="Aptos Narrow"/>
+                        </a:rPr>
+                        <a:t>🟠 High</a:t>
+                      </a:r>
+                    </a:p>
+                  </a:txBody>
+                  <a:tcPr marL="0" marR="0" marT="0" marB="0" anchor="ctr"/>
+                </a:tc>
+                <a:extLst>
+                  <a:ext uri="{0D108BD9-81ED-4DB2-BD59-A6C34878D82A}">
+                    <a16:rowId xmlns:a16="http://schemas.microsoft.com/office/drawing/2014/main" val="10001"/>
+                  </a:ext>
+                </a:extLst>
+              </a:tr>
+              <a:tr h="350000">
+                <a:tc>
+                  <a:txBody>
+                    <a:bodyPr/>
+                    <a:lstStyle/>
+                    <a:p>
+                      <a:pPr algn="ctr" fontAlgn="b"/>
+                      <a:r>
+                        <a:rPr lang="en-US" sz="1400" b="0" dirty="0">
+                          <a:solidFill>
+                            <a:srgbClr val="000000"/>
+                          </a:solidFill>
+                          <a:latin typeface="Aptos Narrow"/>
+                        </a:rPr>
+                        <a:t>904</a:t>
+                      </a:r>
+                    </a:p>
+                  </a:txBody>
+                  <a:tcPr marL="0" marR="0" marT="0" marB="0" anchor="ctr"/>
+                </a:tc>
+                <a:tc>
+                  <a:txBody>
+                    <a:bodyPr/>
+                    <a:lstStyle/>
+                    <a:p>
+                      <a:pPr algn="l" fontAlgn="b"/>
+                      <a:r>
+                        <a:rPr lang="en-US" sz="1400" b="0" dirty="0">
+                          <a:solidFill>
+                            <a:srgbClr val="000000"/>
+                          </a:solidFill>
+                          <a:latin typeface="Aptos Narrow"/>
+                        </a:rPr>
+                        <a:t>Purchase reservations (App Services)</a:t>
+                      </a:r>
+                    </a:p>
+                  </a:txBody>
+                  <a:tcPr marL="0" marR="0" marT="0" marB="0" anchor="ctr"/>
+                </a:tc>
+                <a:tc>
+                  <a:txBody>
+                    <a:bodyPr/>
+                    <a:lstStyle/>
+                    <a:p>
+                      <a:pPr algn="ctr" fontAlgn="b"/>
+                      <a:r>
+                        <a:rPr lang="en-US" sz="1400" b="0" dirty="0">
+                          <a:solidFill>
+                            <a:srgbClr val="000000"/>
+                          </a:solidFill>
+                          <a:latin typeface="Aptos Narrow"/>
+                        </a:rPr>
+                        <a:t>55%</a:t>
+                      </a:r>
+                    </a:p>
+                  </a:txBody>
+                  <a:tcPr marL="0" marR="0" marT="0" marB="0" anchor="ctr"/>
+                </a:tc>
+                <a:tc>
+                  <a:txBody>
+                    <a:bodyPr/>
+                    <a:lstStyle/>
+                    <a:p>
+                      <a:pPr algn="ctr" fontAlgn="b"/>
+                      <a:r>
+                        <a:rPr lang="en-US" sz="1400" b="0" dirty="0">
+                          <a:solidFill>
+                            <a:srgbClr val="000000"/>
+                          </a:solidFill>
+                          <a:latin typeface="Aptos Narrow"/>
+                        </a:rPr>
+                        <a:t>⚪ Not Started</a:t>
+                      </a:r>
+                    </a:p>
+                  </a:txBody>
+                  <a:tcPr marL="0" marR="0" marT="0" marB="0" anchor="ctr"/>
+                </a:tc>
+                <a:tc>
+                  <a:txBody>
+                    <a:bodyPr/>
+                    <a:lstStyle/>
+                    <a:p>
+                      <a:pPr algn="ctr" fontAlgn="b"/>
+                      <a:r>
+                        <a:rPr lang="en-US" sz="1400" b="0" dirty="0">
+                          <a:solidFill>
+                            <a:srgbClr val="000000"/>
+                          </a:solidFill>
+                          <a:latin typeface="Aptos Narrow"/>
+                        </a:rPr>
+                        <a:t>🟠 High</a:t>
+                      </a:r>
+                    </a:p>
+                  </a:txBody>
+                  <a:tcPr marL="0" marR="0" marT="0" marB="0" anchor="ctr"/>
+                </a:tc>
+                <a:extLst>
+                  <a:ext uri="{0D108BD9-81ED-4DB2-BD59-A6C34878D82A}">
+                    <a16:rowId xmlns:a16="http://schemas.microsoft.com/office/drawing/2014/main" val="10001"/>
+                  </a:ext>
+                </a:extLst>
+              </a:tr>
+              <a:tr h="350000">
+                <a:tc>
+                  <a:txBody>
+                    <a:bodyPr/>
+                    <a:lstStyle/>
+                    <a:p>
+                      <a:pPr algn="ctr" fontAlgn="b"/>
+                      <a:r>
+                        <a:rPr lang="en-US" sz="1400" b="0" dirty="0">
+                          <a:solidFill>
+                            <a:srgbClr val="000000"/>
+                          </a:solidFill>
+                          <a:latin typeface="Aptos Narrow"/>
+                        </a:rPr>
+                        <a:t>905</a:t>
+                      </a:r>
+                    </a:p>
+                  </a:txBody>
+                  <a:tcPr marL="0" marR="0" marT="0" marB="0" anchor="ctr"/>
+                </a:tc>
+                <a:tc>
+                  <a:txBody>
+                    <a:bodyPr/>
+                    <a:lstStyle/>
+                    <a:p>
+                      <a:pPr algn="l" fontAlgn="b"/>
+                      <a:r>
+                        <a:rPr lang="en-US" sz="1400" b="0" dirty="0">
+                          <a:solidFill>
+                            <a:srgbClr val="000000"/>
+                          </a:solidFill>
+                          <a:latin typeface="Aptos Narrow"/>
+                        </a:rPr>
+                        <a:t>Purchase reservations (DBs)</a:t>
+                      </a:r>
+                    </a:p>
+                  </a:txBody>
+                  <a:tcPr marL="0" marR="0" marT="0" marB="0" anchor="ctr"/>
+                </a:tc>
+                <a:tc>
+                  <a:txBody>
+                    <a:bodyPr/>
+                    <a:lstStyle/>
+                    <a:p>
+                      <a:pPr algn="ctr" fontAlgn="b"/>
+                      <a:r>
+                        <a:rPr lang="en-US" sz="1400" b="0" dirty="0">
+                          <a:solidFill>
+                            <a:srgbClr val="000000"/>
+                          </a:solidFill>
+                          <a:latin typeface="Aptos Narrow"/>
+                        </a:rPr>
+                        <a:t>50%</a:t>
+                      </a:r>
+                    </a:p>
+                  </a:txBody>
+                  <a:tcPr marL="0" marR="0" marT="0" marB="0" anchor="ctr"/>
+                </a:tc>
+                <a:tc>
+                  <a:txBody>
+                    <a:bodyPr/>
+                    <a:lstStyle/>
+                    <a:p>
+                      <a:pPr algn="ctr" fontAlgn="b"/>
+                      <a:r>
+                        <a:rPr lang="en-US" sz="1400" b="0" dirty="0">
+                          <a:solidFill>
+                            <a:srgbClr val="000000"/>
+                          </a:solidFill>
+                          <a:latin typeface="Aptos Narrow"/>
+                        </a:rPr>
+                        <a:t>⚪ Not Started</a:t>
+                      </a:r>
+                    </a:p>
+                  </a:txBody>
+                  <a:tcPr marL="0" marR="0" marT="0" marB="0" anchor="ctr"/>
+                </a:tc>
+                <a:tc>
+                  <a:txBody>
+                    <a:bodyPr/>
+                    <a:lstStyle/>
+                    <a:p>
+                      <a:pPr algn="ctr" fontAlgn="b"/>
+                      <a:r>
+                        <a:rPr lang="en-US" sz="1400" b="0" dirty="0">
+                          <a:solidFill>
+                            <a:srgbClr val="000000"/>
+                          </a:solidFill>
+                          <a:latin typeface="Aptos Narrow"/>
+                        </a:rPr>
+                        <a:t>🟠 High</a:t>
+                      </a:r>
+                    </a:p>
+                  </a:txBody>
+                  <a:tcPr marL="0" marR="0" marT="0" marB="0" anchor="ctr"/>
+                </a:tc>
+                <a:extLst>
+                  <a:ext uri="{0D108BD9-81ED-4DB2-BD59-A6C34878D82A}">
+                    <a16:rowId xmlns:a16="http://schemas.microsoft.com/office/drawing/2014/main" val="10001"/>
+                  </a:ext>
+                </a:extLst>
+              </a:tr>
+              <a:tr h="350000">
+                <a:tc>
+                  <a:txBody>
+                    <a:bodyPr/>
+                    <a:lstStyle/>
+                    <a:p>
+                      <a:pPr algn="ctr" fontAlgn="b"/>
+                      <a:r>
+                        <a:rPr lang="en-US" sz="1400" b="0" dirty="0">
+                          <a:solidFill>
+                            <a:srgbClr val="000000"/>
+                          </a:solidFill>
+                          <a:latin typeface="Aptos Narrow"/>
+                        </a:rPr>
+                        <a:t>812</a:t>
+                      </a:r>
+                    </a:p>
+                  </a:txBody>
+                  <a:tcPr marL="0" marR="0" marT="0" marB="0" anchor="ctr"/>
+                </a:tc>
+                <a:tc>
+                  <a:txBody>
+                    <a:bodyPr/>
+                    <a:lstStyle/>
+                    <a:p>
+                      <a:pPr algn="l" fontAlgn="b"/>
+                      <a:r>
+                        <a:rPr lang="en-US" sz="1400" b="0" dirty="0">
+                          <a:solidFill>
+                            <a:srgbClr val="000000"/>
+                          </a:solidFill>
+                          <a:latin typeface="Aptos Narrow"/>
+                        </a:rPr>
+                        <a:t>Delete orphaned resources</a:t>
+                      </a:r>
+                    </a:p>
+                  </a:txBody>
+                  <a:tcPr marL="0" marR="0" marT="0" marB="0" anchor="ctr"/>
+                </a:tc>
+                <a:tc>
+                  <a:txBody>
+                    <a:bodyPr/>
+                    <a:lstStyle/>
+                    <a:p>
+                      <a:pPr algn="ctr" fontAlgn="b"/>
+                      <a:r>
+                        <a:rPr lang="en-US" sz="1400" b="0" dirty="0">
+                          <a:solidFill>
+                            <a:srgbClr val="000000"/>
+                          </a:solidFill>
+                          <a:latin typeface="Aptos Narrow"/>
+                        </a:rPr>
+                        <a:t>0%</a:t>
+                      </a:r>
+                    </a:p>
+                  </a:txBody>
+                  <a:tcPr marL="0" marR="0" marT="0" marB="0" anchor="ctr"/>
+                </a:tc>
+                <a:tc>
+                  <a:txBody>
+                    <a:bodyPr/>
+                    <a:lstStyle/>
+                    <a:p>
+                      <a:pPr algn="ctr" fontAlgn="b"/>
+                      <a:r>
+                        <a:rPr lang="en-US" sz="1400" b="0" dirty="0">
+                          <a:solidFill>
+                            <a:srgbClr val="000000"/>
+                          </a:solidFill>
+                          <a:latin typeface="Aptos Narrow"/>
+                        </a:rPr>
+                        <a:t>🔵 In Progress</a:t>
+                      </a:r>
+                    </a:p>
+                  </a:txBody>
+                  <a:tcPr marL="0" marR="0" marT="0" marB="0" anchor="ctr"/>
+                </a:tc>
+                <a:tc>
+                  <a:txBody>
+                    <a:bodyPr/>
+                    <a:lstStyle/>
+                    <a:p>
+                      <a:pPr algn="ctr" fontAlgn="b"/>
+                      <a:r>
+                        <a:rPr lang="en-US" sz="1400" b="0" dirty="0">
+                          <a:solidFill>
+                            <a:srgbClr val="000000"/>
+                          </a:solidFill>
+                          <a:latin typeface="Aptos Narrow"/>
+                        </a:rPr>
+                        <a:t>🟠 High</a:t>
+                      </a:r>
+                    </a:p>
+                  </a:txBody>
+                  <a:tcPr marL="0" marR="0" marT="0" marB="0" anchor="ctr"/>
+                </a:tc>
+                <a:extLst>
+                  <a:ext uri="{0D108BD9-81ED-4DB2-BD59-A6C34878D82A}">
+                    <a16:rowId xmlns:a16="http://schemas.microsoft.com/office/drawing/2014/main" val="10001"/>
+                  </a:ext>
+                </a:extLst>
+              </a:tr>
+              <a:tr h="350000">
+                <a:tc>
+                  <a:txBody>
+                    <a:bodyPr/>
+                    <a:lstStyle/>
+                    <a:p>
+                      <a:pPr algn="ctr" fontAlgn="b"/>
+                      <a:r>
+                        <a:rPr lang="en-US" sz="1400" b="0" dirty="0">
+                          <a:solidFill>
+                            <a:srgbClr val="000000"/>
+                          </a:solidFill>
+                          <a:latin typeface="Aptos Narrow"/>
+                        </a:rPr>
+                        <a:t>906</a:t>
+                      </a:r>
+                    </a:p>
+                  </a:txBody>
+                  <a:tcPr marL="0" marR="0" marT="0" marB="0" anchor="ctr"/>
+                </a:tc>
+                <a:tc>
+                  <a:txBody>
+                    <a:bodyPr/>
+                    <a:lstStyle/>
+                    <a:p>
+                      <a:pPr algn="l" fontAlgn="b"/>
+                      <a:r>
+                        <a:rPr lang="en-US" sz="1400" b="0" dirty="0">
+                          <a:solidFill>
+                            <a:srgbClr val="000000"/>
+                          </a:solidFill>
+                          <a:latin typeface="Aptos Narrow"/>
+                        </a:rPr>
+                        <a:t>Purchase reservations (Redis)</a:t>
+                      </a:r>
+                    </a:p>
+                  </a:txBody>
+                  <a:tcPr marL="0" marR="0" marT="0" marB="0" anchor="ctr"/>
+                </a:tc>
+                <a:tc>
+                  <a:txBody>
+                    <a:bodyPr/>
+                    <a:lstStyle/>
+                    <a:p>
+                      <a:pPr algn="ctr" fontAlgn="b"/>
+                      <a:r>
+                        <a:rPr lang="en-US" sz="1400" b="0" dirty="0">
+                          <a:solidFill>
+                            <a:srgbClr val="000000"/>
+                          </a:solidFill>
+                          <a:latin typeface="Aptos Narrow"/>
+                        </a:rPr>
+                        <a:t>0%</a:t>
+                      </a:r>
+                    </a:p>
+                  </a:txBody>
+                  <a:tcPr marL="0" marR="0" marT="0" marB="0" anchor="ctr"/>
+                </a:tc>
+                <a:tc>
+                  <a:txBody>
+                    <a:bodyPr/>
+                    <a:lstStyle/>
+                    <a:p>
+                      <a:pPr algn="ctr" fontAlgn="b"/>
+                      <a:r>
+                        <a:rPr lang="en-US" sz="1400" b="0" dirty="0">
+                          <a:solidFill>
+                            <a:srgbClr val="000000"/>
+                          </a:solidFill>
+                          <a:latin typeface="Aptos Narrow"/>
+                        </a:rPr>
+                        <a:t>⚪ Not Started</a:t>
+                      </a:r>
+                    </a:p>
+                  </a:txBody>
+                  <a:tcPr marL="0" marR="0" marT="0" marB="0" anchor="ctr"/>
+                </a:tc>
+                <a:tc>
+                  <a:txBody>
+                    <a:bodyPr/>
+                    <a:lstStyle/>
+                    <a:p>
+                      <a:pPr algn="ctr" fontAlgn="b"/>
+                      <a:r>
+                        <a:rPr lang="en-US" sz="1400" b="0" dirty="0">
+                          <a:solidFill>
+                            <a:srgbClr val="000000"/>
+                          </a:solidFill>
+                          <a:latin typeface="Aptos Narrow"/>
+                        </a:rPr>
+                        <a:t>🟠 High</a:t>
                       </a:r>
                     </a:p>
                   </a:txBody>
@@ -21809,7 +22975,7 @@
                   <a:latin typeface="Poppins SemiBold" panose="00000700000000000000" pitchFamily="2" charset="0"/>
                   <a:cs typeface="Poppins SemiBold" panose="00000700000000000000" pitchFamily="2" charset="0"/>
                 </a:rPr>
-                <a:t>{{Save$}}</a:t>
+                <a:t>$270,818</a:t>
               </a:r>
               <a:r>
                 <a:rPr lang="ru-RU" sz="2800" b="1" dirty="0">
@@ -21915,7 +23081,7 @@
                     <a:schemeClr val="bg1"/>
                   </a:solidFill>
                 </a:rPr>
-                <a:t>{{SvPct}}</a:t>
+                <a:t>14.5%</a:t>
               </a:r>
               <a:r>
                 <a:rPr lang="en-US" sz="1400" b="1" dirty="0">
@@ -22027,7 +23193,7 @@
               <a:pPr algn="ctr"/>
               <a:r>
                 <a:rPr lang="en-US" sz="2800" b="1" dirty="0"/>
-                <a:t>{{CurrCst}}</a:t>
+                <a:t>$1,868,452</a:t>
               </a:r>
             </a:p>
           </p:txBody>
@@ -22171,7 +23337,7 @@
               <a:pPr algn="ctr"/>
               <a:r>
                 <a:rPr lang="en-US" sz="2800" b="1" dirty="0"/>
-                <a:t>{{OptCst}}</a:t>
+                <a:t>$1,597,633</a:t>
               </a:r>
             </a:p>
           </p:txBody>

</xml_diff>